<commit_message>
feat(job): update job version
升级job版本为2.2.1版本
</commit_message>
<xml_diff>
--- a/ses-job/doc/XXL-JOB架构图.pptx
+++ b/ses-job/doc/XXL-JOB架构图.pptx
@@ -206,7 +206,7 @@
           <a:p>
             <a:fld id="{D2A48B96-639E-45A3-A0BA-2464DFDB1FAA}" type="datetimeFigureOut">
               <a:rPr lang="zh-CN" altLang="en-US" smtClean="0"/>
-              <a:t>2019/6/3</a:t>
+              <a:t>2019/10/11</a:t>
             </a:fld>
             <a:endParaRPr lang="zh-CN" altLang="en-US"/>
           </a:p>
@@ -2262,7 +2262,7 @@
           <a:p>
             <a:fld id="{D997B5FA-0921-464F-AAE1-844C04324D75}" type="datetimeFigureOut">
               <a:rPr lang="zh-CN" altLang="en-US" smtClean="0"/>
-              <a:t>2019/6/3</a:t>
+              <a:t>2019/10/11</a:t>
             </a:fld>
             <a:endParaRPr lang="zh-CN" altLang="en-US"/>
           </a:p>
@@ -2427,7 +2427,7 @@
           <a:p>
             <a:fld id="{D997B5FA-0921-464F-AAE1-844C04324D75}" type="datetimeFigureOut">
               <a:rPr lang="zh-CN" altLang="en-US" smtClean="0"/>
-              <a:t>2019/6/3</a:t>
+              <a:t>2019/10/11</a:t>
             </a:fld>
             <a:endParaRPr lang="zh-CN" altLang="en-US"/>
           </a:p>
@@ -2602,7 +2602,7 @@
           <a:p>
             <a:fld id="{D997B5FA-0921-464F-AAE1-844C04324D75}" type="datetimeFigureOut">
               <a:rPr lang="zh-CN" altLang="en-US" smtClean="0"/>
-              <a:t>2019/6/3</a:t>
+              <a:t>2019/10/11</a:t>
             </a:fld>
             <a:endParaRPr lang="zh-CN" altLang="en-US"/>
           </a:p>
@@ -2767,7 +2767,7 @@
           <a:p>
             <a:fld id="{D997B5FA-0921-464F-AAE1-844C04324D75}" type="datetimeFigureOut">
               <a:rPr lang="zh-CN" altLang="en-US" smtClean="0"/>
-              <a:t>2019/6/3</a:t>
+              <a:t>2019/10/11</a:t>
             </a:fld>
             <a:endParaRPr lang="zh-CN" altLang="en-US"/>
           </a:p>
@@ -3008,7 +3008,7 @@
           <a:p>
             <a:fld id="{D997B5FA-0921-464F-AAE1-844C04324D75}" type="datetimeFigureOut">
               <a:rPr lang="zh-CN" altLang="en-US" smtClean="0"/>
-              <a:t>2019/6/3</a:t>
+              <a:t>2019/10/11</a:t>
             </a:fld>
             <a:endParaRPr lang="zh-CN" altLang="en-US"/>
           </a:p>
@@ -3235,7 +3235,7 @@
           <a:p>
             <a:fld id="{D997B5FA-0921-464F-AAE1-844C04324D75}" type="datetimeFigureOut">
               <a:rPr lang="zh-CN" altLang="en-US" smtClean="0"/>
-              <a:t>2019/6/3</a:t>
+              <a:t>2019/10/11</a:t>
             </a:fld>
             <a:endParaRPr lang="zh-CN" altLang="en-US"/>
           </a:p>
@@ -3597,7 +3597,7 @@
           <a:p>
             <a:fld id="{D997B5FA-0921-464F-AAE1-844C04324D75}" type="datetimeFigureOut">
               <a:rPr lang="zh-CN" altLang="en-US" smtClean="0"/>
-              <a:t>2019/6/3</a:t>
+              <a:t>2019/10/11</a:t>
             </a:fld>
             <a:endParaRPr lang="zh-CN" altLang="en-US"/>
           </a:p>
@@ -3710,7 +3710,7 @@
           <a:p>
             <a:fld id="{D997B5FA-0921-464F-AAE1-844C04324D75}" type="datetimeFigureOut">
               <a:rPr lang="zh-CN" altLang="en-US" smtClean="0"/>
-              <a:t>2019/6/3</a:t>
+              <a:t>2019/10/11</a:t>
             </a:fld>
             <a:endParaRPr lang="zh-CN" altLang="en-US"/>
           </a:p>
@@ -3800,7 +3800,7 @@
           <a:p>
             <a:fld id="{D997B5FA-0921-464F-AAE1-844C04324D75}" type="datetimeFigureOut">
               <a:rPr lang="zh-CN" altLang="en-US" smtClean="0"/>
-              <a:t>2019/6/3</a:t>
+              <a:t>2019/10/11</a:t>
             </a:fld>
             <a:endParaRPr lang="zh-CN" altLang="en-US"/>
           </a:p>
@@ -4072,7 +4072,7 @@
           <a:p>
             <a:fld id="{D997B5FA-0921-464F-AAE1-844C04324D75}" type="datetimeFigureOut">
               <a:rPr lang="zh-CN" altLang="en-US" smtClean="0"/>
-              <a:t>2019/6/3</a:t>
+              <a:t>2019/10/11</a:t>
             </a:fld>
             <a:endParaRPr lang="zh-CN" altLang="en-US"/>
           </a:p>
@@ -4320,7 +4320,7 @@
           <a:p>
             <a:fld id="{D997B5FA-0921-464F-AAE1-844C04324D75}" type="datetimeFigureOut">
               <a:rPr lang="zh-CN" altLang="en-US" smtClean="0"/>
-              <a:t>2019/6/3</a:t>
+              <a:t>2019/10/11</a:t>
             </a:fld>
             <a:endParaRPr lang="zh-CN" altLang="en-US"/>
           </a:p>
@@ -4528,7 +4528,7 @@
           <a:p>
             <a:fld id="{D997B5FA-0921-464F-AAE1-844C04324D75}" type="datetimeFigureOut">
               <a:rPr lang="zh-CN" altLang="en-US" smtClean="0"/>
-              <a:t>2019/6/3</a:t>
+              <a:t>2019/10/11</a:t>
             </a:fld>
             <a:endParaRPr lang="zh-CN" altLang="en-US"/>
           </a:p>
@@ -8942,23 +8942,7 @@
                 <a:ea typeface="Heiti SC Light" charset="-122"/>
                 <a:cs typeface="Heiti SC Light" charset="-122"/>
               </a:rPr>
-              <a:t>(</a:t>
-            </a:r>
-            <a:r>
-              <a:rPr kumimoji="1" lang="en-US" altLang="zh-CN" sz="1400" dirty="0">
-                <a:latin typeface="Heiti SC Light" charset="-122"/>
-                <a:ea typeface="Heiti SC Light" charset="-122"/>
-                <a:cs typeface="Heiti SC Light" charset="-122"/>
-              </a:rPr>
-              <a:t>timewheel</a:t>
-            </a:r>
-            <a:r>
-              <a:rPr kumimoji="1" lang="en-US" altLang="zh-CN" sz="1400" dirty="0">
-                <a:latin typeface="Heiti SC Light" charset="-122"/>
-                <a:ea typeface="Heiti SC Light" charset="-122"/>
-                <a:cs typeface="Heiti SC Light" charset="-122"/>
-              </a:rPr>
-              <a:t>)</a:t>
+              <a:t>(timewheel)</a:t>
             </a:r>
             <a:endParaRPr kumimoji="1" lang="zh-CN" altLang="en-US" sz="1400" dirty="0" smtClean="0">
               <a:latin typeface="Heiti SC Light" charset="-122"/>
@@ -8975,7 +8959,7 @@
           <p:nvPr/>
         </p:nvCxnSpPr>
         <p:spPr>
-          <a:xfrm flipH="1">
+          <a:xfrm rot="10800000" flipH="1">
             <a:off x="5945824" y="1334309"/>
             <a:ext cx="893129" cy="645"/>
           </a:xfrm>

</xml_diff>